<commit_message>
final changes for submission
</commit_message>
<xml_diff>
--- a/presentation/Präsentation.pptx
+++ b/presentation/Präsentation.pptx
@@ -291,6 +291,7 @@
           <a:p>
             <a:fld id="{E293D1F9-5A50-4B7F-87E7-BFBC0318C6FB}" type="datetimeFigureOut">
               <a:rPr lang="de-DE" smtClean="0"/>
+              <a:pPr/>
               <a:t>23.06.2025</a:t>
             </a:fld>
             <a:endParaRPr lang="de-DE"/>
@@ -333,6 +334,7 @@
           <a:p>
             <a:fld id="{235F72B9-939F-497B-BD78-2CB3C3414EDA}" type="slidenum">
               <a:rPr lang="de-DE" smtClean="0"/>
+              <a:pPr/>
               <a:t>‹Nr.›</a:t>
             </a:fld>
             <a:endParaRPr lang="de-DE"/>
@@ -456,6 +458,7 @@
           <a:p>
             <a:fld id="{E293D1F9-5A50-4B7F-87E7-BFBC0318C6FB}" type="datetimeFigureOut">
               <a:rPr lang="de-DE" smtClean="0"/>
+              <a:pPr/>
               <a:t>23.06.2025</a:t>
             </a:fld>
             <a:endParaRPr lang="de-DE"/>
@@ -498,6 +501,7 @@
           <a:p>
             <a:fld id="{235F72B9-939F-497B-BD78-2CB3C3414EDA}" type="slidenum">
               <a:rPr lang="de-DE" smtClean="0"/>
+              <a:pPr/>
               <a:t>‹Nr.›</a:t>
             </a:fld>
             <a:endParaRPr lang="de-DE"/>
@@ -631,6 +635,7 @@
           <a:p>
             <a:fld id="{E293D1F9-5A50-4B7F-87E7-BFBC0318C6FB}" type="datetimeFigureOut">
               <a:rPr lang="de-DE" smtClean="0"/>
+              <a:pPr/>
               <a:t>23.06.2025</a:t>
             </a:fld>
             <a:endParaRPr lang="de-DE"/>
@@ -673,6 +678,7 @@
           <a:p>
             <a:fld id="{235F72B9-939F-497B-BD78-2CB3C3414EDA}" type="slidenum">
               <a:rPr lang="de-DE" smtClean="0"/>
+              <a:pPr/>
               <a:t>‹Nr.›</a:t>
             </a:fld>
             <a:endParaRPr lang="de-DE"/>
@@ -796,6 +802,7 @@
           <a:p>
             <a:fld id="{E293D1F9-5A50-4B7F-87E7-BFBC0318C6FB}" type="datetimeFigureOut">
               <a:rPr lang="de-DE" smtClean="0"/>
+              <a:pPr/>
               <a:t>23.06.2025</a:t>
             </a:fld>
             <a:endParaRPr lang="de-DE"/>
@@ -838,6 +845,7 @@
           <a:p>
             <a:fld id="{235F72B9-939F-497B-BD78-2CB3C3414EDA}" type="slidenum">
               <a:rPr lang="de-DE" smtClean="0"/>
+              <a:pPr/>
               <a:t>‹Nr.›</a:t>
             </a:fld>
             <a:endParaRPr lang="de-DE"/>
@@ -1037,6 +1045,7 @@
           <a:p>
             <a:fld id="{E293D1F9-5A50-4B7F-87E7-BFBC0318C6FB}" type="datetimeFigureOut">
               <a:rPr lang="de-DE" smtClean="0"/>
+              <a:pPr/>
               <a:t>23.06.2025</a:t>
             </a:fld>
             <a:endParaRPr lang="de-DE"/>
@@ -1079,6 +1088,7 @@
           <a:p>
             <a:fld id="{235F72B9-939F-497B-BD78-2CB3C3414EDA}" type="slidenum">
               <a:rPr lang="de-DE" smtClean="0"/>
+              <a:pPr/>
               <a:t>‹Nr.›</a:t>
             </a:fld>
             <a:endParaRPr lang="de-DE"/>
@@ -1320,6 +1330,7 @@
           <a:p>
             <a:fld id="{E293D1F9-5A50-4B7F-87E7-BFBC0318C6FB}" type="datetimeFigureOut">
               <a:rPr lang="de-DE" smtClean="0"/>
+              <a:pPr/>
               <a:t>23.06.2025</a:t>
             </a:fld>
             <a:endParaRPr lang="de-DE"/>
@@ -1362,6 +1373,7 @@
           <a:p>
             <a:fld id="{235F72B9-939F-497B-BD78-2CB3C3414EDA}" type="slidenum">
               <a:rPr lang="de-DE" smtClean="0"/>
+              <a:pPr/>
               <a:t>‹Nr.›</a:t>
             </a:fld>
             <a:endParaRPr lang="de-DE"/>
@@ -1737,6 +1749,7 @@
           <a:p>
             <a:fld id="{E293D1F9-5A50-4B7F-87E7-BFBC0318C6FB}" type="datetimeFigureOut">
               <a:rPr lang="de-DE" smtClean="0"/>
+              <a:pPr/>
               <a:t>23.06.2025</a:t>
             </a:fld>
             <a:endParaRPr lang="de-DE"/>
@@ -1779,6 +1792,7 @@
           <a:p>
             <a:fld id="{235F72B9-939F-497B-BD78-2CB3C3414EDA}" type="slidenum">
               <a:rPr lang="de-DE" smtClean="0"/>
+              <a:pPr/>
               <a:t>‹Nr.›</a:t>
             </a:fld>
             <a:endParaRPr lang="de-DE"/>
@@ -1850,6 +1864,7 @@
           <a:p>
             <a:fld id="{E293D1F9-5A50-4B7F-87E7-BFBC0318C6FB}" type="datetimeFigureOut">
               <a:rPr lang="de-DE" smtClean="0"/>
+              <a:pPr/>
               <a:t>23.06.2025</a:t>
             </a:fld>
             <a:endParaRPr lang="de-DE"/>
@@ -1892,6 +1907,7 @@
           <a:p>
             <a:fld id="{235F72B9-939F-497B-BD78-2CB3C3414EDA}" type="slidenum">
               <a:rPr lang="de-DE" smtClean="0"/>
+              <a:pPr/>
               <a:t>‹Nr.›</a:t>
             </a:fld>
             <a:endParaRPr lang="de-DE"/>
@@ -1940,6 +1956,7 @@
           <a:p>
             <a:fld id="{E293D1F9-5A50-4B7F-87E7-BFBC0318C6FB}" type="datetimeFigureOut">
               <a:rPr lang="de-DE" smtClean="0"/>
+              <a:pPr/>
               <a:t>23.06.2025</a:t>
             </a:fld>
             <a:endParaRPr lang="de-DE"/>
@@ -1982,6 +1999,7 @@
           <a:p>
             <a:fld id="{235F72B9-939F-497B-BD78-2CB3C3414EDA}" type="slidenum">
               <a:rPr lang="de-DE" smtClean="0"/>
+              <a:pPr/>
               <a:t>‹Nr.›</a:t>
             </a:fld>
             <a:endParaRPr lang="de-DE"/>
@@ -2212,6 +2230,7 @@
           <a:p>
             <a:fld id="{E293D1F9-5A50-4B7F-87E7-BFBC0318C6FB}" type="datetimeFigureOut">
               <a:rPr lang="de-DE" smtClean="0"/>
+              <a:pPr/>
               <a:t>23.06.2025</a:t>
             </a:fld>
             <a:endParaRPr lang="de-DE"/>
@@ -2254,6 +2273,7 @@
           <a:p>
             <a:fld id="{235F72B9-939F-497B-BD78-2CB3C3414EDA}" type="slidenum">
               <a:rPr lang="de-DE" smtClean="0"/>
+              <a:pPr/>
               <a:t>‹Nr.›</a:t>
             </a:fld>
             <a:endParaRPr lang="de-DE"/>
@@ -2460,6 +2480,7 @@
           <a:p>
             <a:fld id="{E293D1F9-5A50-4B7F-87E7-BFBC0318C6FB}" type="datetimeFigureOut">
               <a:rPr lang="de-DE" smtClean="0"/>
+              <a:pPr/>
               <a:t>23.06.2025</a:t>
             </a:fld>
             <a:endParaRPr lang="de-DE"/>
@@ -2502,6 +2523,7 @@
           <a:p>
             <a:fld id="{235F72B9-939F-497B-BD78-2CB3C3414EDA}" type="slidenum">
               <a:rPr lang="de-DE" smtClean="0"/>
+              <a:pPr/>
               <a:t>‹Nr.›</a:t>
             </a:fld>
             <a:endParaRPr lang="de-DE"/>
@@ -2668,6 +2690,7 @@
           <a:p>
             <a:fld id="{E293D1F9-5A50-4B7F-87E7-BFBC0318C6FB}" type="datetimeFigureOut">
               <a:rPr lang="de-DE" smtClean="0"/>
+              <a:pPr/>
               <a:t>23.06.2025</a:t>
             </a:fld>
             <a:endParaRPr lang="de-DE"/>
@@ -2746,6 +2769,7 @@
           <a:p>
             <a:fld id="{235F72B9-939F-497B-BD78-2CB3C3414EDA}" type="slidenum">
               <a:rPr lang="de-DE" smtClean="0"/>
+              <a:pPr/>
               <a:t>‹Nr.›</a:t>
             </a:fld>
             <a:endParaRPr lang="de-DE"/>
@@ -3850,8 +3874,25 @@
           <a:p>
             <a:r>
               <a:rPr lang="de-DE" dirty="0" smtClean="0"/>
-              <a:t>Enemy:</a:t>
-            </a:r>
+              <a:t>Enemy (</a:t>
+            </a:r>
+            <a:r>
+              <a:rPr lang="de-DE" dirty="0" err="1" smtClean="0"/>
+              <a:t>state</a:t>
+            </a:r>
+            <a:r>
+              <a:rPr lang="de-DE" dirty="0" smtClean="0"/>
+              <a:t> </a:t>
+            </a:r>
+            <a:r>
+              <a:rPr lang="de-DE" dirty="0" err="1" smtClean="0"/>
+              <a:t>machine</a:t>
+            </a:r>
+            <a:r>
+              <a:rPr lang="de-DE" dirty="0" smtClean="0"/>
+              <a:t>):</a:t>
+            </a:r>
+            <a:endParaRPr lang="de-DE" dirty="0" smtClean="0"/>
           </a:p>
           <a:p>
             <a:pPr lvl="1"/>
@@ -4117,73 +4158,86 @@
           <a:p>
             <a:pPr lvl="1"/>
             <a:r>
-              <a:rPr lang="de-DE" dirty="0" smtClean="0"/>
+              <a:rPr lang="de-DE" sz="2700" dirty="0" smtClean="0"/>
               <a:t>Create </a:t>
             </a:r>
             <a:r>
-              <a:rPr lang="de-DE" dirty="0" err="1" smtClean="0"/>
+              <a:rPr lang="de-DE" sz="2700" dirty="0" err="1" smtClean="0"/>
               <a:t>own</a:t>
             </a:r>
             <a:r>
-              <a:rPr lang="de-DE" dirty="0" smtClean="0"/>
+              <a:rPr lang="de-DE" sz="2700" dirty="0" smtClean="0"/>
               <a:t> Sprites - Software (not </a:t>
             </a:r>
             <a:r>
-              <a:rPr lang="de-DE" dirty="0" err="1" smtClean="0"/>
+              <a:rPr lang="de-DE" sz="2700" dirty="0" err="1" smtClean="0"/>
               <a:t>free</a:t>
             </a:r>
             <a:r>
-              <a:rPr lang="de-DE" dirty="0" smtClean="0"/>
+              <a:rPr lang="de-DE" sz="2700" dirty="0" smtClean="0"/>
               <a:t>) - </a:t>
             </a:r>
             <a:r>
-              <a:rPr lang="de-DE" dirty="0" err="1" smtClean="0"/>
+              <a:rPr lang="de-DE" sz="2700" dirty="0" err="1" smtClean="0"/>
               <a:t>no</a:t>
             </a:r>
             <a:r>
-              <a:rPr lang="de-DE" dirty="0" smtClean="0"/>
+              <a:rPr lang="de-DE" sz="2700" dirty="0" smtClean="0"/>
               <a:t> </a:t>
             </a:r>
             <a:r>
-              <a:rPr lang="de-DE" dirty="0" err="1" smtClean="0"/>
+              <a:rPr lang="de-DE" sz="2700" dirty="0" err="1" smtClean="0"/>
               <a:t>talent</a:t>
             </a:r>
             <a:r>
-              <a:rPr lang="de-DE" dirty="0" smtClean="0"/>
+              <a:rPr lang="de-DE" sz="2700" dirty="0" smtClean="0"/>
               <a:t> / </a:t>
             </a:r>
             <a:r>
-              <a:rPr lang="de-DE" dirty="0" err="1" smtClean="0"/>
+              <a:rPr lang="de-DE" sz="2700" dirty="0" err="1" smtClean="0"/>
               <a:t>experience</a:t>
             </a:r>
             <a:r>
-              <a:rPr lang="de-DE" dirty="0" smtClean="0"/>
+              <a:rPr lang="de-DE" sz="2700" dirty="0" smtClean="0"/>
               <a:t> =&gt; (2 </a:t>
             </a:r>
             <a:r>
-              <a:rPr lang="de-DE" dirty="0" err="1" smtClean="0"/>
+              <a:rPr lang="de-DE" sz="2700" dirty="0" err="1" smtClean="0"/>
               <a:t>days</a:t>
             </a:r>
             <a:r>
-              <a:rPr lang="de-DE" dirty="0" smtClean="0"/>
+              <a:rPr lang="de-DE" sz="2700" dirty="0" smtClean="0"/>
               <a:t> </a:t>
             </a:r>
             <a:r>
-              <a:rPr lang="de-DE" dirty="0" err="1" smtClean="0"/>
+              <a:rPr lang="de-DE" sz="2700" dirty="0" err="1" smtClean="0"/>
               <a:t>for</a:t>
             </a:r>
             <a:r>
-              <a:rPr lang="de-DE" dirty="0" smtClean="0"/>
+              <a:rPr lang="de-DE" sz="2700" dirty="0" smtClean="0"/>
               <a:t> </a:t>
             </a:r>
             <a:r>
-              <a:rPr lang="de-DE" dirty="0" err="1" smtClean="0"/>
+              <a:rPr lang="de-DE" sz="2700" dirty="0" smtClean="0"/>
+              <a:t>not </a:t>
+            </a:r>
+            <a:r>
+              <a:rPr lang="de-DE" sz="2700" dirty="0" err="1" smtClean="0"/>
+              <a:t>finished</a:t>
+            </a:r>
+            <a:r>
+              <a:rPr lang="de-DE" sz="2700" dirty="0" smtClean="0"/>
+              <a:t> </a:t>
+            </a:r>
+            <a:r>
+              <a:rPr lang="de-DE" sz="2700" dirty="0" err="1" smtClean="0"/>
               <a:t>wolf</a:t>
             </a:r>
             <a:r>
-              <a:rPr lang="de-DE" dirty="0" smtClean="0"/>
-              <a:t>:)</a:t>
-            </a:r>
+              <a:rPr lang="de-DE" sz="2700" dirty="0" smtClean="0"/>
+              <a:t>)</a:t>
+            </a:r>
+            <a:endParaRPr lang="de-DE" sz="2700" dirty="0" smtClean="0"/>
           </a:p>
           <a:p>
             <a:r>
@@ -4311,7 +4365,6 @@
               <a:rPr lang="de-DE" dirty="0" smtClean="0"/>
               <a:t>)</a:t>
             </a:r>
-            <a:endParaRPr lang="de-DE" dirty="0" smtClean="0"/>
           </a:p>
         </p:txBody>
       </p:sp>

</xml_diff>